<commit_message>
Ajout dossier projets 2023-2024
</commit_message>
<xml_diff>
--- a/cours/Qualité dev Android - 2 - Créer sa première application Android.pptx
+++ b/cours/Qualité dev Android - 2 - Créer sa première application Android.pptx
@@ -5,7 +5,7 @@
     <p:sldMasterId id="2147483675" r:id="rId1"/>
   </p:sldMasterIdLst>
   <p:notesMasterIdLst>
-    <p:notesMasterId r:id="rId29"/>
+    <p:notesMasterId r:id="rId28"/>
   </p:notesMasterIdLst>
   <p:sldIdLst>
     <p:sldId id="256" r:id="rId2"/>
@@ -33,8 +33,7 @@
     <p:sldId id="278" r:id="rId24"/>
     <p:sldId id="280" r:id="rId25"/>
     <p:sldId id="261" r:id="rId26"/>
-    <p:sldId id="282" r:id="rId27"/>
-    <p:sldId id="281" r:id="rId28"/>
+    <p:sldId id="281" r:id="rId27"/>
   </p:sldIdLst>
   <p:sldSz cx="12192000" cy="6858000"/>
   <p:notesSz cx="6858000" cy="9144000"/>
@@ -223,7 +222,7 @@
           <a:p>
             <a:fld id="{ED40DAEB-75EB-C148-AD91-B9BB0D927B5F}" type="datetimeFigureOut">
               <a:rPr lang="fr-FR" smtClean="0"/>
-              <a:t>14/12/2024</a:t>
+              <a:t>16/12/2024</a:t>
             </a:fld>
             <a:endParaRPr lang="fr-FR"/>
           </a:p>
@@ -1098,90 +1097,6 @@
 </p:notes>
 </file>
 
-<file path=ppt/notesSlides/notesSlide15.xml><?xml version="1.0" encoding="utf-8"?>
-<p:notes xmlns:a="http://schemas.openxmlformats.org/drawingml/2006/main" xmlns:r="http://schemas.openxmlformats.org/officeDocument/2006/relationships" xmlns:p="http://schemas.openxmlformats.org/presentationml/2006/main">
-  <p:cSld>
-    <p:spTree>
-      <p:nvGrpSpPr>
-        <p:cNvPr id="1" name=""/>
-        <p:cNvGrpSpPr/>
-        <p:nvPr/>
-      </p:nvGrpSpPr>
-      <p:grpSpPr>
-        <a:xfrm>
-          <a:off x="0" y="0"/>
-          <a:ext cx="0" cy="0"/>
-          <a:chOff x="0" y="0"/>
-          <a:chExt cx="0" cy="0"/>
-        </a:xfrm>
-      </p:grpSpPr>
-      <p:sp>
-        <p:nvSpPr>
-          <p:cNvPr id="2" name="Espace réservé de l'image des diapositives 1"/>
-          <p:cNvSpPr>
-            <a:spLocks noGrp="1" noRot="1" noChangeAspect="1"/>
-          </p:cNvSpPr>
-          <p:nvPr>
-            <p:ph type="sldImg"/>
-          </p:nvPr>
-        </p:nvSpPr>
-        <p:spPr/>
-      </p:sp>
-      <p:sp>
-        <p:nvSpPr>
-          <p:cNvPr id="3" name="Espace réservé des notes 2"/>
-          <p:cNvSpPr>
-            <a:spLocks noGrp="1"/>
-          </p:cNvSpPr>
-          <p:nvPr>
-            <p:ph type="body" idx="1"/>
-          </p:nvPr>
-        </p:nvSpPr>
-        <p:spPr/>
-        <p:txBody>
-          <a:bodyPr/>
-          <a:lstStyle/>
-          <a:p>
-            <a:endParaRPr lang="fr-FR" dirty="0"/>
-          </a:p>
-        </p:txBody>
-      </p:sp>
-      <p:sp>
-        <p:nvSpPr>
-          <p:cNvPr id="4" name="Espace réservé du numéro de diapositive 3"/>
-          <p:cNvSpPr>
-            <a:spLocks noGrp="1"/>
-          </p:cNvSpPr>
-          <p:nvPr>
-            <p:ph type="sldNum" sz="quarter" idx="5"/>
-          </p:nvPr>
-        </p:nvSpPr>
-        <p:spPr/>
-        <p:txBody>
-          <a:bodyPr/>
-          <a:lstStyle/>
-          <a:p>
-            <a:fld id="{A9CCDBE3-2331-5649-91C5-50C244F0923B}" type="slidenum">
-              <a:rPr lang="fr-FR" smtClean="0"/>
-              <a:t>26</a:t>
-            </a:fld>
-            <a:endParaRPr lang="fr-FR"/>
-          </a:p>
-        </p:txBody>
-      </p:sp>
-    </p:spTree>
-    <p:extLst>
-      <p:ext uri="{BB962C8B-B14F-4D97-AF65-F5344CB8AC3E}">
-        <p14:creationId xmlns:p14="http://schemas.microsoft.com/office/powerpoint/2010/main" val="23504449"/>
-      </p:ext>
-    </p:extLst>
-  </p:cSld>
-  <p:clrMapOvr>
-    <a:masterClrMapping/>
-  </p:clrMapOvr>
-</p:notes>
-</file>
-
 <file path=ppt/notesSlides/notesSlide2.xml><?xml version="1.0" encoding="utf-8"?>
 <p:notes xmlns:a="http://schemas.openxmlformats.org/drawingml/2006/main" xmlns:r="http://schemas.openxmlformats.org/officeDocument/2006/relationships" xmlns:p="http://schemas.openxmlformats.org/presentationml/2006/main">
   <p:cSld>
@@ -2057,7 +1972,7 @@
           <a:effectLst/>
           <a:extLst>
             <a:ext uri="{91240B29-F687-4f45-9708-019B960494DF}">
-              <a14:hiddenLine xmlns="" xmlns:a14="http://schemas.microsoft.com/office/drawing/2010/main" w="9525">
+              <a14:hiddenLine xmlns:a14="http://schemas.microsoft.com/office/drawing/2010/main" xmlns="" w="9525">
                 <a:solidFill>
                   <a:srgbClr val="000000"/>
                 </a:solidFill>
@@ -2249,7 +2164,7 @@
           <a:p>
             <a:fld id="{AD9926F9-6299-264A-A9B6-8488B6652ED0}" type="datetime1">
               <a:rPr lang="fr-FR" smtClean="0"/>
-              <a:t>14/12/2024</a:t>
+              <a:t>16/12/2024</a:t>
             </a:fld>
             <a:endParaRPr lang="fr-FR"/>
           </a:p>
@@ -2570,7 +2485,7 @@
           <a:p>
             <a:fld id="{8B92D2F0-7240-2343-B1BF-04B2169B3982}" type="datetime1">
               <a:rPr lang="fr-FR" smtClean="0"/>
-              <a:t>14/12/2024</a:t>
+              <a:t>16/12/2024</a:t>
             </a:fld>
             <a:endParaRPr lang="fr-FR"/>
           </a:p>
@@ -3061,7 +2976,7 @@
           <a:p>
             <a:fld id="{C674CAC6-91D6-AD49-91C6-A903F8057C68}" type="datetime1">
               <a:rPr lang="fr-FR" smtClean="0"/>
-              <a:t>14/12/2024</a:t>
+              <a:t>16/12/2024</a:t>
             </a:fld>
             <a:endParaRPr lang="fr-FR"/>
           </a:p>
@@ -3433,7 +3348,7 @@
           <a:p>
             <a:fld id="{568D8971-FDB0-BE47-B1B2-394B4AFD55A7}" type="datetime1">
               <a:rPr lang="fr-FR" smtClean="0"/>
-              <a:t>14/12/2024</a:t>
+              <a:t>16/12/2024</a:t>
             </a:fld>
             <a:endParaRPr lang="fr-FR"/>
           </a:p>
@@ -3591,7 +3506,7 @@
           <a:ln/>
           <a:extLst>
             <a:ext uri="{91240B29-F687-4f45-9708-019B960494DF}">
-              <a14:hiddenLine xmlns="" xmlns:a14="http://schemas.microsoft.com/office/drawing/2010/main" w="9525">
+              <a14:hiddenLine xmlns:a14="http://schemas.microsoft.com/office/drawing/2010/main" xmlns="" w="9525">
                 <a:solidFill>
                   <a:srgbClr val="000000"/>
                 </a:solidFill>
@@ -3709,7 +3624,7 @@
           <a:p>
             <a:fld id="{CA4F50E2-D527-E64C-A017-EE19D2455313}" type="datetime1">
               <a:rPr lang="fr-FR" smtClean="0"/>
-              <a:t>14/12/2024</a:t>
+              <a:t>16/12/2024</a:t>
             </a:fld>
             <a:endParaRPr lang="fr-FR"/>
           </a:p>
@@ -3869,7 +3784,7 @@
           <a:ln/>
           <a:extLst>
             <a:ext uri="{91240B29-F687-4f45-9708-019B960494DF}">
-              <a14:hiddenLine xmlns="" xmlns:a14="http://schemas.microsoft.com/office/drawing/2010/main" w="9525">
+              <a14:hiddenLine xmlns:a14="http://schemas.microsoft.com/office/drawing/2010/main" xmlns="" w="9525">
                 <a:solidFill>
                   <a:srgbClr val="000000"/>
                 </a:solidFill>
@@ -3997,7 +3912,7 @@
           <a:p>
             <a:fld id="{8573E6B2-2CD4-5C44-B4FF-386DCA4D509B}" type="datetime1">
               <a:rPr lang="fr-FR" smtClean="0"/>
-              <a:t>14/12/2024</a:t>
+              <a:t>16/12/2024</a:t>
             </a:fld>
             <a:endParaRPr lang="fr-FR"/>
           </a:p>
@@ -4155,7 +4070,7 @@
           <a:ln/>
           <a:extLst>
             <a:ext uri="{91240B29-F687-4f45-9708-019B960494DF}">
-              <a14:hiddenLine xmlns="" xmlns:a14="http://schemas.microsoft.com/office/drawing/2010/main" w="9525">
+              <a14:hiddenLine xmlns:a14="http://schemas.microsoft.com/office/drawing/2010/main" xmlns="" w="9525">
                 <a:solidFill>
                   <a:srgbClr val="000000"/>
                 </a:solidFill>
@@ -4283,7 +4198,7 @@
           <a:p>
             <a:fld id="{3F74877B-E295-3642-94D6-CABFF8F5A056}" type="datetime1">
               <a:rPr lang="fr-FR" smtClean="0"/>
-              <a:t>14/12/2024</a:t>
+              <a:t>16/12/2024</a:t>
             </a:fld>
             <a:endParaRPr lang="fr-FR"/>
           </a:p>
@@ -4629,7 +4544,7 @@
           <a:p>
             <a:fld id="{745BB7D1-9832-6A45-B565-2293D467D491}" type="datetime1">
               <a:rPr lang="fr-FR" smtClean="0"/>
-              <a:t>14/12/2024</a:t>
+              <a:t>16/12/2024</a:t>
             </a:fld>
             <a:endParaRPr lang="fr-FR"/>
           </a:p>
@@ -4787,7 +4702,7 @@
           <a:ln/>
           <a:extLst>
             <a:ext uri="{91240B29-F687-4f45-9708-019B960494DF}">
-              <a14:hiddenLine xmlns="" xmlns:a14="http://schemas.microsoft.com/office/drawing/2010/main" w="9525">
+              <a14:hiddenLine xmlns:a14="http://schemas.microsoft.com/office/drawing/2010/main" xmlns="" w="9525">
                 <a:solidFill>
                   <a:srgbClr val="000000"/>
                 </a:solidFill>
@@ -4971,7 +4886,7 @@
           <a:p>
             <a:fld id="{94660B41-9D44-7146-85E0-8870C5CE1FA8}" type="datetime1">
               <a:rPr lang="fr-FR" smtClean="0"/>
-              <a:t>14/12/2024</a:t>
+              <a:t>16/12/2024</a:t>
             </a:fld>
             <a:endParaRPr lang="fr-FR"/>
           </a:p>
@@ -5129,7 +5044,7 @@
           <a:ln/>
           <a:extLst>
             <a:ext uri="{91240B29-F687-4f45-9708-019B960494DF}">
-              <a14:hiddenLine xmlns="" xmlns:a14="http://schemas.microsoft.com/office/drawing/2010/main" w="9525">
+              <a14:hiddenLine xmlns:a14="http://schemas.microsoft.com/office/drawing/2010/main" xmlns="" w="9525">
                 <a:solidFill>
                   <a:srgbClr val="000000"/>
                 </a:solidFill>
@@ -5451,7 +5366,7 @@
           <a:p>
             <a:fld id="{701CD4C1-B9E5-8743-AC85-6A600D6BAA6A}" type="datetime1">
               <a:rPr lang="fr-FR" smtClean="0"/>
-              <a:t>14/12/2024</a:t>
+              <a:t>16/12/2024</a:t>
             </a:fld>
             <a:endParaRPr lang="fr-FR"/>
           </a:p>
@@ -5609,7 +5524,7 @@
           <a:ln/>
           <a:extLst>
             <a:ext uri="{91240B29-F687-4f45-9708-019B960494DF}">
-              <a14:hiddenLine xmlns="" xmlns:a14="http://schemas.microsoft.com/office/drawing/2010/main" w="9525">
+              <a14:hiddenLine xmlns:a14="http://schemas.microsoft.com/office/drawing/2010/main" xmlns="" w="9525">
                 <a:solidFill>
                   <a:srgbClr val="000000"/>
                 </a:solidFill>
@@ -5675,7 +5590,7 @@
           <a:p>
             <a:fld id="{45A25620-1665-444F-ACE8-C51F2B8E56AD}" type="datetime1">
               <a:rPr lang="fr-FR" smtClean="0"/>
-              <a:t>14/12/2024</a:t>
+              <a:t>16/12/2024</a:t>
             </a:fld>
             <a:endParaRPr lang="fr-FR"/>
           </a:p>
@@ -5773,7 +5688,7 @@
           <a:p>
             <a:fld id="{D04887B8-9350-9644-9F18-A7D4851BA4E8}" type="datetime1">
               <a:rPr lang="fr-FR" smtClean="0"/>
-              <a:t>14/12/2024</a:t>
+              <a:t>16/12/2024</a:t>
             </a:fld>
             <a:endParaRPr lang="fr-FR"/>
           </a:p>
@@ -6044,7 +5959,7 @@
           <a:ln/>
           <a:extLst>
             <a:ext uri="{91240B29-F687-4f45-9708-019B960494DF}">
-              <a14:hiddenLine xmlns="" xmlns:a14="http://schemas.microsoft.com/office/drawing/2010/main" w="9525">
+              <a14:hiddenLine xmlns:a14="http://schemas.microsoft.com/office/drawing/2010/main" xmlns="" w="9525">
                 <a:solidFill>
                   <a:srgbClr val="000000"/>
                 </a:solidFill>
@@ -6243,7 +6158,7 @@
           <a:p>
             <a:fld id="{A3968153-E4C2-C64F-8070-6F220534D068}" type="datetime1">
               <a:rPr lang="fr-FR" smtClean="0"/>
-              <a:t>14/12/2024</a:t>
+              <a:t>16/12/2024</a:t>
             </a:fld>
             <a:endParaRPr lang="fr-FR"/>
           </a:p>
@@ -6559,7 +6474,7 @@
           <a:p>
             <a:fld id="{D73AD2C0-67F0-914E-BB5B-D622DA2AB0DA}" type="datetime1">
               <a:rPr lang="fr-FR" smtClean="0"/>
-              <a:t>14/12/2024</a:t>
+              <a:t>16/12/2024</a:t>
             </a:fld>
             <a:endParaRPr lang="fr-FR"/>
           </a:p>
@@ -6835,7 +6750,7 @@
           <a:p>
             <a:fld id="{1846064A-5ED5-484F-A877-86B8D3CBA50F}" type="datetime1">
               <a:rPr lang="fr-FR" smtClean="0"/>
-              <a:t>14/12/2024</a:t>
+              <a:t>16/12/2024</a:t>
             </a:fld>
             <a:endParaRPr lang="fr-FR"/>
           </a:p>
@@ -10006,13 +9921,8 @@
           <a:p>
             <a:r>
               <a:rPr lang="fr-FR" dirty="0"/>
-              <a:t>Bonne pratique – Ressource </a:t>
-            </a:r>
-            <a:r>
-              <a:rPr lang="fr-FR" dirty="0" err="1"/>
-              <a:t>sting</a:t>
-            </a:r>
-            <a:endParaRPr lang="fr-FR" dirty="0"/>
+              <a:t>Bonne pratique – Ressource string</a:t>
+            </a:r>
           </a:p>
         </p:txBody>
       </p:sp>
@@ -10468,7 +10378,7 @@
           <a:p>
             <a:r>
               <a:rPr lang="fr-FR" dirty="0"/>
-              <a:t>Quiz ????</a:t>
+              <a:t>Quiz </a:t>
             </a:r>
           </a:p>
         </p:txBody>
@@ -10492,38 +10402,24 @@
         <p:spPr/>
         <p:txBody>
           <a:bodyPr>
-            <a:normAutofit fontScale="47500" lnSpcReduction="20000"/>
+            <a:normAutofit/>
           </a:bodyPr>
           <a:lstStyle/>
           <a:p>
-            <a:r>
-              <a:rPr lang="fr-FR" dirty="0"/>
-              <a:t>https://</a:t>
-            </a:r>
-            <a:r>
-              <a:rPr lang="fr-FR" dirty="0" err="1"/>
-              <a:t>developer.android.com</a:t>
-            </a:r>
-            <a:r>
-              <a:rPr lang="fr-FR" dirty="0"/>
-              <a:t>/courses/</a:t>
-            </a:r>
-            <a:r>
-              <a:rPr lang="fr-FR" dirty="0" err="1"/>
-              <a:t>quizzes</a:t>
-            </a:r>
-            <a:r>
-              <a:rPr lang="fr-FR" dirty="0"/>
-              <a:t>/android-basics-compose-unit-1-pathway-2/android-basics-compose-unit-1-pathway-2?hl=</a:t>
-            </a:r>
-            <a:r>
-              <a:rPr lang="fr-FR" dirty="0" err="1"/>
-              <a:t>fr&amp;continue</a:t>
-            </a:r>
-            <a:r>
-              <a:rPr lang="fr-FR" dirty="0"/>
-              <a:t>=https%3A%2F%2Fdeveloper.android.com%2Fcourses%2Fpathways%2Fandroid-basics-compose-unit-1-pathway-2%3Fhl%3Dfr%23quiz-%2Fcourses%2Fquizzes%2Fandroid-basics-compose-unit-1-pathway-2%2Fandroid-basics-compose-unit-1-pathway-2</a:t>
-            </a:r>
+            <a:pPr marL="0" indent="0" algn="l" defTabSz="457200" rtl="0" eaLnBrk="1" latinLnBrk="0" hangingPunct="1">
+              <a:spcBef>
+                <a:spcPct val="20000"/>
+              </a:spcBef>
+              <a:spcAft>
+                <a:spcPts val="600"/>
+              </a:spcAft>
+              <a:buClr>
+                <a:schemeClr val="accent1"/>
+              </a:buClr>
+              <a:buFont typeface="Wingdings 2" charset="2"/>
+              <a:buNone/>
+            </a:pPr>
+            <a:endParaRPr lang="fr-FR" dirty="0"/>
           </a:p>
         </p:txBody>
       </p:sp>
@@ -10616,146 +10512,6 @@
       </p:grpSpPr>
       <p:sp>
         <p:nvSpPr>
-          <p:cNvPr id="2" name="Titre 1">
-            <a:extLst>
-              <a:ext uri="{FF2B5EF4-FFF2-40B4-BE49-F238E27FC236}">
-                <a16:creationId xmlns:a16="http://schemas.microsoft.com/office/drawing/2014/main" id="{097B25B2-BFAC-807E-9CAB-ADAE014398B6}"/>
-              </a:ext>
-            </a:extLst>
-          </p:cNvPr>
-          <p:cNvSpPr>
-            <a:spLocks noGrp="1"/>
-          </p:cNvSpPr>
-          <p:nvPr>
-            <p:ph type="title"/>
-          </p:nvPr>
-        </p:nvSpPr>
-        <p:spPr/>
-        <p:txBody>
-          <a:bodyPr/>
-          <a:lstStyle/>
-          <a:p>
-            <a:r>
-              <a:rPr lang="fr-FR" dirty="0"/>
-              <a:t>À retenir</a:t>
-            </a:r>
-          </a:p>
-        </p:txBody>
-      </p:sp>
-      <p:sp>
-        <p:nvSpPr>
-          <p:cNvPr id="3" name="Espace réservé du contenu 2">
-            <a:extLst>
-              <a:ext uri="{FF2B5EF4-FFF2-40B4-BE49-F238E27FC236}">
-                <a16:creationId xmlns:a16="http://schemas.microsoft.com/office/drawing/2014/main" id="{8E5F3F75-4234-5774-6CFA-51705A332CF8}"/>
-              </a:ext>
-            </a:extLst>
-          </p:cNvPr>
-          <p:cNvSpPr>
-            <a:spLocks noGrp="1"/>
-          </p:cNvSpPr>
-          <p:nvPr>
-            <p:ph idx="1"/>
-          </p:nvPr>
-        </p:nvSpPr>
-        <p:spPr/>
-        <p:txBody>
-          <a:bodyPr/>
-          <a:lstStyle/>
-          <a:p>
-            <a:endParaRPr lang="fr-FR" dirty="0"/>
-          </a:p>
-        </p:txBody>
-      </p:sp>
-      <p:sp>
-        <p:nvSpPr>
-          <p:cNvPr id="4" name="Espace réservé du pied de page 3">
-            <a:extLst>
-              <a:ext uri="{FF2B5EF4-FFF2-40B4-BE49-F238E27FC236}">
-                <a16:creationId xmlns:a16="http://schemas.microsoft.com/office/drawing/2014/main" id="{9B7BDA0F-87C8-C1D1-C6F1-E1351579DB42}"/>
-              </a:ext>
-            </a:extLst>
-          </p:cNvPr>
-          <p:cNvSpPr>
-            <a:spLocks noGrp="1"/>
-          </p:cNvSpPr>
-          <p:nvPr>
-            <p:ph type="ftr" sz="quarter" idx="11"/>
-          </p:nvPr>
-        </p:nvSpPr>
-        <p:spPr/>
-        <p:txBody>
-          <a:bodyPr/>
-          <a:lstStyle/>
-          <a:p>
-            <a:r>
-              <a:rPr lang="fr-FR"/>
-              <a:t>Qualité de développement Android par Jocelyn CARAMAN</a:t>
-            </a:r>
-          </a:p>
-        </p:txBody>
-      </p:sp>
-      <p:sp>
-        <p:nvSpPr>
-          <p:cNvPr id="5" name="Espace réservé du numéro de diapositive 4">
-            <a:extLst>
-              <a:ext uri="{FF2B5EF4-FFF2-40B4-BE49-F238E27FC236}">
-                <a16:creationId xmlns:a16="http://schemas.microsoft.com/office/drawing/2014/main" id="{5E662B2E-B5DD-2850-ED26-F84B0D24E60C}"/>
-              </a:ext>
-            </a:extLst>
-          </p:cNvPr>
-          <p:cNvSpPr>
-            <a:spLocks noGrp="1"/>
-          </p:cNvSpPr>
-          <p:nvPr>
-            <p:ph type="sldNum" sz="quarter" idx="12"/>
-          </p:nvPr>
-        </p:nvSpPr>
-        <p:spPr/>
-        <p:txBody>
-          <a:bodyPr/>
-          <a:lstStyle/>
-          <a:p>
-            <a:fld id="{E56C0B03-5220-9646-862E-F81FB060D833}" type="slidenum">
-              <a:rPr lang="fr-FR" smtClean="0"/>
-              <a:t>26</a:t>
-            </a:fld>
-            <a:endParaRPr lang="fr-FR"/>
-          </a:p>
-        </p:txBody>
-      </p:sp>
-    </p:spTree>
-    <p:extLst>
-      <p:ext uri="{BB962C8B-B14F-4D97-AF65-F5344CB8AC3E}">
-        <p14:creationId xmlns:p14="http://schemas.microsoft.com/office/powerpoint/2010/main" val="2892076210"/>
-      </p:ext>
-    </p:extLst>
-  </p:cSld>
-  <p:clrMapOvr>
-    <a:masterClrMapping/>
-  </p:clrMapOvr>
-</p:sld>
-</file>
-
-<file path=ppt/slides/slide27.xml><?xml version="1.0" encoding="utf-8"?>
-<p:sld xmlns:a="http://schemas.openxmlformats.org/drawingml/2006/main" xmlns:r="http://schemas.openxmlformats.org/officeDocument/2006/relationships" xmlns:p="http://schemas.openxmlformats.org/presentationml/2006/main">
-  <p:cSld>
-    <p:spTree>
-      <p:nvGrpSpPr>
-        <p:cNvPr id="1" name=""/>
-        <p:cNvGrpSpPr/>
-        <p:nvPr/>
-      </p:nvGrpSpPr>
-      <p:grpSpPr>
-        <a:xfrm>
-          <a:off x="0" y="0"/>
-          <a:ext cx="0" cy="0"/>
-          <a:chOff x="0" y="0"/>
-          <a:chExt cx="0" cy="0"/>
-        </a:xfrm>
-      </p:grpSpPr>
-      <p:sp>
-        <p:nvSpPr>
           <p:cNvPr id="4" name="Titre 3">
             <a:extLst>
               <a:ext uri="{FF2B5EF4-FFF2-40B4-BE49-F238E27FC236}">
@@ -10898,7 +10654,7 @@
           <a:p>
             <a:fld id="{E56C0B03-5220-9646-862E-F81FB060D833}" type="slidenum">
               <a:rPr lang="fr-FR" smtClean="0"/>
-              <a:t>27</a:t>
+              <a:t>26</a:t>
             </a:fld>
             <a:endParaRPr lang="fr-FR"/>
           </a:p>

</xml_diff>